<commit_message>
Aktualizacja PowerBI oraz prezentacji
</commit_message>
<xml_diff>
--- a/Technologia vs GDP.pptx
+++ b/Technologia vs GDP.pptx
@@ -5,7 +5,7 @@
     <p:sldMasterId id="2147483668" r:id="rId1"/>
   </p:sldMasterIdLst>
   <p:notesMasterIdLst>
-    <p:notesMasterId r:id="rId12"/>
+    <p:notesMasterId r:id="rId14"/>
   </p:notesMasterIdLst>
   <p:sldIdLst>
     <p:sldId id="256" r:id="rId2"/>
@@ -17,7 +17,9 @@
     <p:sldId id="261" r:id="rId8"/>
     <p:sldId id="263" r:id="rId9"/>
     <p:sldId id="264" r:id="rId10"/>
-    <p:sldId id="265" r:id="rId11"/>
+    <p:sldId id="267" r:id="rId11"/>
+    <p:sldId id="268" r:id="rId12"/>
+    <p:sldId id="265" r:id="rId13"/>
   </p:sldIdLst>
   <p:sldSz cx="12192000" cy="6858000"/>
   <p:notesSz cx="6858000" cy="9144000"/>
@@ -206,7 +208,7 @@
           <a:p>
             <a:fld id="{4738F603-E8B0-4797-A376-255C478D0C23}" type="datetimeFigureOut">
               <a:rPr lang="pl-PL" smtClean="0"/>
-              <a:t>10.05.2024</a:t>
+              <a:t>20.05.2024</a:t>
             </a:fld>
             <a:endParaRPr lang="pl-PL"/>
           </a:p>
@@ -519,129 +521,7 @@
           <a:p>
             <a:pPr rtl="0">
               <a:buFont typeface="+mj-lt"/>
-              <a:buAutoNum type="arabicPeriod"/>
-            </a:pPr>
-            <a:r>
-              <a:rPr lang="pl-PL" dirty="0"/>
-              <a:t>Opis projektu, osoby wykonujące jako autorzy</a:t>
-            </a:r>
-          </a:p>
-          <a:p>
-            <a:pPr rtl="0">
-              <a:buFont typeface="+mj-lt"/>
-              <a:buAutoNum type="arabicPeriod"/>
-            </a:pPr>
-            <a:r>
-              <a:rPr lang="pl-PL" dirty="0"/>
-              <a:t>Link do MS </a:t>
-            </a:r>
-            <a:r>
-              <a:rPr lang="pl-PL" dirty="0" err="1"/>
-              <a:t>DevOps</a:t>
-            </a:r>
-            <a:endParaRPr lang="pl-PL" dirty="0"/>
-          </a:p>
-          <a:p>
-            <a:pPr rtl="0">
-              <a:buFont typeface="+mj-lt"/>
-              <a:buAutoNum type="arabicPeriod"/>
-            </a:pPr>
-            <a:r>
-              <a:rPr lang="pl-PL" dirty="0"/>
-              <a:t>Diagram dobranej architektury rozwiązania</a:t>
-            </a:r>
-          </a:p>
-          <a:p>
-            <a:pPr rtl="0">
-              <a:buFont typeface="+mj-lt"/>
-              <a:buAutoNum type="arabicPeriod"/>
-            </a:pPr>
-            <a:r>
-              <a:rPr lang="pl-PL" dirty="0" err="1"/>
-              <a:t>Screenshoty</a:t>
-            </a:r>
-            <a:r>
-              <a:rPr lang="pl-PL" dirty="0"/>
-              <a:t> z projektu</a:t>
-            </a:r>
-          </a:p>
-          <a:p>
-            <a:pPr rtl="0">
-              <a:buFont typeface="+mj-lt"/>
-              <a:buAutoNum type="arabicPeriod"/>
-            </a:pPr>
-            <a:endParaRPr lang="pl-PL" dirty="0"/>
-          </a:p>
-          <a:p>
-            <a:pPr rtl="0">
-              <a:buFont typeface="+mj-lt"/>
-              <a:buAutoNum type="arabicPeriod"/>
-            </a:pPr>
-            <a:endParaRPr lang="pl-PL" dirty="0"/>
-          </a:p>
-          <a:p>
-            <a:pPr marL="0" marR="0" lvl="0" indent="0" algn="l" defTabSz="914400" rtl="0" eaLnBrk="1" fontAlgn="auto" latinLnBrk="0" hangingPunct="1">
-              <a:lnSpc>
-                <a:spcPct val="100000"/>
-              </a:lnSpc>
-              <a:spcBef>
-                <a:spcPts val="0"/>
-              </a:spcBef>
-              <a:spcAft>
-                <a:spcPts val="0"/>
-              </a:spcAft>
-              <a:buClrTx/>
-              <a:buSzTx/>
-              <a:buFont typeface="+mj-lt"/>
-              <a:buNone/>
-              <a:tabLst/>
-              <a:defRPr/>
-            </a:pPr>
-            <a:r>
-              <a:rPr lang="pl-PL" sz="1200" dirty="0">
-                <a:solidFill>
-                  <a:schemeClr val="accent2">
-                    <a:lumMod val="60000"/>
-                    <a:lumOff val="40000"/>
-                  </a:schemeClr>
-                </a:solidFill>
-              </a:rPr>
-              <a:t>1. dostęp do technologii komunikacyjnych vs. GDP w czasie</a:t>
-            </a:r>
-            <a:br>
-              <a:rPr lang="pl-PL" sz="1200" dirty="0">
-                <a:solidFill>
-                  <a:schemeClr val="accent2">
-                    <a:lumMod val="60000"/>
-                    <a:lumOff val="40000"/>
-                  </a:schemeClr>
-                </a:solidFill>
-              </a:rPr>
-            </a:br>
-            <a:r>
-              <a:rPr lang="pl-PL" sz="1200" dirty="0">
-                <a:solidFill>
-                  <a:schemeClr val="accent2">
-                    <a:lumMod val="60000"/>
-                    <a:lumOff val="40000"/>
-                  </a:schemeClr>
-                </a:solidFill>
-              </a:rPr>
-              <a:t>2. dostęp do środków transportu i ich efektywność energetyczna/emisyjność</a:t>
-            </a:r>
-            <a:endParaRPr lang="pl-PL" sz="4400" dirty="0">
-              <a:solidFill>
-                <a:schemeClr val="accent2">
-                  <a:lumMod val="60000"/>
-                  <a:lumOff val="40000"/>
-                </a:schemeClr>
-              </a:solidFill>
-            </a:endParaRPr>
-          </a:p>
-          <a:p>
-            <a:pPr rtl="0">
-              <a:buFont typeface="+mj-lt"/>
-              <a:buAutoNum type="arabicPeriod"/>
+              <a:buNone/>
             </a:pPr>
             <a:endParaRPr lang="pl-PL" dirty="0"/>
           </a:p>
@@ -674,6 +554,90 @@
     <p:extLst>
       <p:ext uri="{BB962C8B-B14F-4D97-AF65-F5344CB8AC3E}">
         <p14:creationId xmlns:p14="http://schemas.microsoft.com/office/powerpoint/2010/main" val="2580126728"/>
+      </p:ext>
+    </p:extLst>
+  </p:cSld>
+  <p:clrMapOvr>
+    <a:masterClrMapping/>
+  </p:clrMapOvr>
+</p:notes>
+</file>
+
+<file path=ppt/notesSlides/notesSlide10.xml><?xml version="1.0" encoding="utf-8"?>
+<p:notes xmlns:a="http://schemas.openxmlformats.org/drawingml/2006/main" xmlns:r="http://schemas.openxmlformats.org/officeDocument/2006/relationships" xmlns:p="http://schemas.openxmlformats.org/presentationml/2006/main">
+  <p:cSld>
+    <p:spTree>
+      <p:nvGrpSpPr>
+        <p:cNvPr id="1" name=""/>
+        <p:cNvGrpSpPr/>
+        <p:nvPr/>
+      </p:nvGrpSpPr>
+      <p:grpSpPr>
+        <a:xfrm>
+          <a:off x="0" y="0"/>
+          <a:ext cx="0" cy="0"/>
+          <a:chOff x="0" y="0"/>
+          <a:chExt cx="0" cy="0"/>
+        </a:xfrm>
+      </p:grpSpPr>
+      <p:sp>
+        <p:nvSpPr>
+          <p:cNvPr id="2" name="Symbol zastępczy obrazu slajdu 1"/>
+          <p:cNvSpPr>
+            <a:spLocks noGrp="1" noRot="1" noChangeAspect="1"/>
+          </p:cNvSpPr>
+          <p:nvPr>
+            <p:ph type="sldImg"/>
+          </p:nvPr>
+        </p:nvSpPr>
+        <p:spPr/>
+      </p:sp>
+      <p:sp>
+        <p:nvSpPr>
+          <p:cNvPr id="3" name="Symbol zastępczy notatek 2"/>
+          <p:cNvSpPr>
+            <a:spLocks noGrp="1"/>
+          </p:cNvSpPr>
+          <p:nvPr>
+            <p:ph type="body" idx="1"/>
+          </p:nvPr>
+        </p:nvSpPr>
+        <p:spPr/>
+        <p:txBody>
+          <a:bodyPr/>
+          <a:lstStyle/>
+          <a:p>
+            <a:endParaRPr lang="pl-PL" dirty="0"/>
+          </a:p>
+        </p:txBody>
+      </p:sp>
+      <p:sp>
+        <p:nvSpPr>
+          <p:cNvPr id="4" name="Symbol zastępczy numeru slajdu 3"/>
+          <p:cNvSpPr>
+            <a:spLocks noGrp="1"/>
+          </p:cNvSpPr>
+          <p:nvPr>
+            <p:ph type="sldNum" sz="quarter" idx="5"/>
+          </p:nvPr>
+        </p:nvSpPr>
+        <p:spPr/>
+        <p:txBody>
+          <a:bodyPr/>
+          <a:lstStyle/>
+          <a:p>
+            <a:fld id="{AEBA54A6-3330-4606-883F-AF8607A5599A}" type="slidenum">
+              <a:rPr lang="pl-PL" smtClean="0"/>
+              <a:t>12</a:t>
+            </a:fld>
+            <a:endParaRPr lang="pl-PL"/>
+          </a:p>
+        </p:txBody>
+      </p:sp>
+    </p:spTree>
+    <p:extLst>
+      <p:ext uri="{BB962C8B-B14F-4D97-AF65-F5344CB8AC3E}">
+        <p14:creationId xmlns:p14="http://schemas.microsoft.com/office/powerpoint/2010/main" val="2981258641"/>
       </p:ext>
     </p:extLst>
   </p:cSld>
@@ -727,6 +691,23 @@
           <a:bodyPr/>
           <a:lstStyle/>
           <a:p>
+            <a:pPr marL="0" marR="0" lvl="0" indent="0" algn="l" defTabSz="914400" rtl="0" eaLnBrk="1" fontAlgn="auto" latinLnBrk="0" hangingPunct="1">
+              <a:lnSpc>
+                <a:spcPct val="100000"/>
+              </a:lnSpc>
+              <a:spcBef>
+                <a:spcPts val="0"/>
+              </a:spcBef>
+              <a:spcAft>
+                <a:spcPts val="0"/>
+              </a:spcAft>
+              <a:buClrTx/>
+              <a:buSzTx/>
+              <a:buFontTx/>
+              <a:buNone/>
+              <a:tabLst/>
+              <a:defRPr/>
+            </a:pPr>
             <a:endParaRPr lang="pl-PL" dirty="0"/>
           </a:p>
         </p:txBody>
@@ -1084,6 +1065,174 @@
           <a:p>
             <a:fld id="{AEBA54A6-3330-4606-883F-AF8607A5599A}" type="slidenum">
               <a:rPr lang="pl-PL" smtClean="0"/>
+              <a:t>8</a:t>
+            </a:fld>
+            <a:endParaRPr lang="pl-PL"/>
+          </a:p>
+        </p:txBody>
+      </p:sp>
+    </p:spTree>
+    <p:extLst>
+      <p:ext uri="{BB962C8B-B14F-4D97-AF65-F5344CB8AC3E}">
+        <p14:creationId xmlns:p14="http://schemas.microsoft.com/office/powerpoint/2010/main" val="1670277816"/>
+      </p:ext>
+    </p:extLst>
+  </p:cSld>
+  <p:clrMapOvr>
+    <a:masterClrMapping/>
+  </p:clrMapOvr>
+</p:notes>
+</file>
+
+<file path=ppt/notesSlides/notesSlide7.xml><?xml version="1.0" encoding="utf-8"?>
+<p:notes xmlns:a="http://schemas.openxmlformats.org/drawingml/2006/main" xmlns:r="http://schemas.openxmlformats.org/officeDocument/2006/relationships" xmlns:p="http://schemas.openxmlformats.org/presentationml/2006/main">
+  <p:cSld>
+    <p:spTree>
+      <p:nvGrpSpPr>
+        <p:cNvPr id="1" name=""/>
+        <p:cNvGrpSpPr/>
+        <p:nvPr/>
+      </p:nvGrpSpPr>
+      <p:grpSpPr>
+        <a:xfrm>
+          <a:off x="0" y="0"/>
+          <a:ext cx="0" cy="0"/>
+          <a:chOff x="0" y="0"/>
+          <a:chExt cx="0" cy="0"/>
+        </a:xfrm>
+      </p:grpSpPr>
+      <p:sp>
+        <p:nvSpPr>
+          <p:cNvPr id="2" name="Symbol zastępczy obrazu slajdu 1"/>
+          <p:cNvSpPr>
+            <a:spLocks noGrp="1" noRot="1" noChangeAspect="1"/>
+          </p:cNvSpPr>
+          <p:nvPr>
+            <p:ph type="sldImg"/>
+          </p:nvPr>
+        </p:nvSpPr>
+        <p:spPr/>
+      </p:sp>
+      <p:sp>
+        <p:nvSpPr>
+          <p:cNvPr id="3" name="Symbol zastępczy notatek 2"/>
+          <p:cNvSpPr>
+            <a:spLocks noGrp="1"/>
+          </p:cNvSpPr>
+          <p:nvPr>
+            <p:ph type="body" idx="1"/>
+          </p:nvPr>
+        </p:nvSpPr>
+        <p:spPr/>
+        <p:txBody>
+          <a:bodyPr/>
+          <a:lstStyle/>
+          <a:p>
+            <a:endParaRPr lang="pl-PL" dirty="0"/>
+          </a:p>
+        </p:txBody>
+      </p:sp>
+      <p:sp>
+        <p:nvSpPr>
+          <p:cNvPr id="4" name="Symbol zastępczy numeru slajdu 3"/>
+          <p:cNvSpPr>
+            <a:spLocks noGrp="1"/>
+          </p:cNvSpPr>
+          <p:nvPr>
+            <p:ph type="sldNum" sz="quarter" idx="5"/>
+          </p:nvPr>
+        </p:nvSpPr>
+        <p:spPr/>
+        <p:txBody>
+          <a:bodyPr/>
+          <a:lstStyle/>
+          <a:p>
+            <a:fld id="{AEBA54A6-3330-4606-883F-AF8607A5599A}" type="slidenum">
+              <a:rPr lang="pl-PL" smtClean="0"/>
+              <a:t>9</a:t>
+            </a:fld>
+            <a:endParaRPr lang="pl-PL"/>
+          </a:p>
+        </p:txBody>
+      </p:sp>
+    </p:spTree>
+    <p:extLst>
+      <p:ext uri="{BB962C8B-B14F-4D97-AF65-F5344CB8AC3E}">
+        <p14:creationId xmlns:p14="http://schemas.microsoft.com/office/powerpoint/2010/main" val="2091233177"/>
+      </p:ext>
+    </p:extLst>
+  </p:cSld>
+  <p:clrMapOvr>
+    <a:masterClrMapping/>
+  </p:clrMapOvr>
+</p:notes>
+</file>
+
+<file path=ppt/notesSlides/notesSlide8.xml><?xml version="1.0" encoding="utf-8"?>
+<p:notes xmlns:a="http://schemas.openxmlformats.org/drawingml/2006/main" xmlns:r="http://schemas.openxmlformats.org/officeDocument/2006/relationships" xmlns:p="http://schemas.openxmlformats.org/presentationml/2006/main">
+  <p:cSld>
+    <p:spTree>
+      <p:nvGrpSpPr>
+        <p:cNvPr id="1" name=""/>
+        <p:cNvGrpSpPr/>
+        <p:nvPr/>
+      </p:nvGrpSpPr>
+      <p:grpSpPr>
+        <a:xfrm>
+          <a:off x="0" y="0"/>
+          <a:ext cx="0" cy="0"/>
+          <a:chOff x="0" y="0"/>
+          <a:chExt cx="0" cy="0"/>
+        </a:xfrm>
+      </p:grpSpPr>
+      <p:sp>
+        <p:nvSpPr>
+          <p:cNvPr id="2" name="Symbol zastępczy obrazu slajdu 1"/>
+          <p:cNvSpPr>
+            <a:spLocks noGrp="1" noRot="1" noChangeAspect="1"/>
+          </p:cNvSpPr>
+          <p:nvPr>
+            <p:ph type="sldImg"/>
+          </p:nvPr>
+        </p:nvSpPr>
+        <p:spPr/>
+      </p:sp>
+      <p:sp>
+        <p:nvSpPr>
+          <p:cNvPr id="3" name="Symbol zastępczy notatek 2"/>
+          <p:cNvSpPr>
+            <a:spLocks noGrp="1"/>
+          </p:cNvSpPr>
+          <p:nvPr>
+            <p:ph type="body" idx="1"/>
+          </p:nvPr>
+        </p:nvSpPr>
+        <p:spPr/>
+        <p:txBody>
+          <a:bodyPr/>
+          <a:lstStyle/>
+          <a:p>
+            <a:endParaRPr lang="pl-PL" dirty="0"/>
+          </a:p>
+        </p:txBody>
+      </p:sp>
+      <p:sp>
+        <p:nvSpPr>
+          <p:cNvPr id="4" name="Symbol zastępczy numeru slajdu 3"/>
+          <p:cNvSpPr>
+            <a:spLocks noGrp="1"/>
+          </p:cNvSpPr>
+          <p:nvPr>
+            <p:ph type="sldNum" sz="quarter" idx="5"/>
+          </p:nvPr>
+        </p:nvSpPr>
+        <p:spPr/>
+        <p:txBody>
+          <a:bodyPr/>
+          <a:lstStyle/>
+          <a:p>
+            <a:fld id="{AEBA54A6-3330-4606-883F-AF8607A5599A}" type="slidenum">
+              <a:rPr lang="pl-PL" smtClean="0"/>
               <a:t>10</a:t>
             </a:fld>
             <a:endParaRPr lang="pl-PL"/>
@@ -1093,7 +1242,91 @@
     </p:spTree>
     <p:extLst>
       <p:ext uri="{BB962C8B-B14F-4D97-AF65-F5344CB8AC3E}">
-        <p14:creationId xmlns:p14="http://schemas.microsoft.com/office/powerpoint/2010/main" val="2981258641"/>
+        <p14:creationId xmlns:p14="http://schemas.microsoft.com/office/powerpoint/2010/main" val="3784672556"/>
+      </p:ext>
+    </p:extLst>
+  </p:cSld>
+  <p:clrMapOvr>
+    <a:masterClrMapping/>
+  </p:clrMapOvr>
+</p:notes>
+</file>
+
+<file path=ppt/notesSlides/notesSlide9.xml><?xml version="1.0" encoding="utf-8"?>
+<p:notes xmlns:a="http://schemas.openxmlformats.org/drawingml/2006/main" xmlns:r="http://schemas.openxmlformats.org/officeDocument/2006/relationships" xmlns:p="http://schemas.openxmlformats.org/presentationml/2006/main">
+  <p:cSld>
+    <p:spTree>
+      <p:nvGrpSpPr>
+        <p:cNvPr id="1" name=""/>
+        <p:cNvGrpSpPr/>
+        <p:nvPr/>
+      </p:nvGrpSpPr>
+      <p:grpSpPr>
+        <a:xfrm>
+          <a:off x="0" y="0"/>
+          <a:ext cx="0" cy="0"/>
+          <a:chOff x="0" y="0"/>
+          <a:chExt cx="0" cy="0"/>
+        </a:xfrm>
+      </p:grpSpPr>
+      <p:sp>
+        <p:nvSpPr>
+          <p:cNvPr id="2" name="Symbol zastępczy obrazu slajdu 1"/>
+          <p:cNvSpPr>
+            <a:spLocks noGrp="1" noRot="1" noChangeAspect="1"/>
+          </p:cNvSpPr>
+          <p:nvPr>
+            <p:ph type="sldImg"/>
+          </p:nvPr>
+        </p:nvSpPr>
+        <p:spPr/>
+      </p:sp>
+      <p:sp>
+        <p:nvSpPr>
+          <p:cNvPr id="3" name="Symbol zastępczy notatek 2"/>
+          <p:cNvSpPr>
+            <a:spLocks noGrp="1"/>
+          </p:cNvSpPr>
+          <p:nvPr>
+            <p:ph type="body" idx="1"/>
+          </p:nvPr>
+        </p:nvSpPr>
+        <p:spPr/>
+        <p:txBody>
+          <a:bodyPr/>
+          <a:lstStyle/>
+          <a:p>
+            <a:endParaRPr lang="pl-PL" dirty="0"/>
+          </a:p>
+        </p:txBody>
+      </p:sp>
+      <p:sp>
+        <p:nvSpPr>
+          <p:cNvPr id="4" name="Symbol zastępczy numeru slajdu 3"/>
+          <p:cNvSpPr>
+            <a:spLocks noGrp="1"/>
+          </p:cNvSpPr>
+          <p:nvPr>
+            <p:ph type="sldNum" sz="quarter" idx="5"/>
+          </p:nvPr>
+        </p:nvSpPr>
+        <p:spPr/>
+        <p:txBody>
+          <a:bodyPr/>
+          <a:lstStyle/>
+          <a:p>
+            <a:fld id="{AEBA54A6-3330-4606-883F-AF8607A5599A}" type="slidenum">
+              <a:rPr lang="pl-PL" smtClean="0"/>
+              <a:t>11</a:t>
+            </a:fld>
+            <a:endParaRPr lang="pl-PL"/>
+          </a:p>
+        </p:txBody>
+      </p:sp>
+    </p:spTree>
+    <p:extLst>
+      <p:ext uri="{BB962C8B-B14F-4D97-AF65-F5344CB8AC3E}">
+        <p14:creationId xmlns:p14="http://schemas.microsoft.com/office/powerpoint/2010/main" val="1443967095"/>
       </p:ext>
     </p:extLst>
   </p:cSld>
@@ -1849,7 +2082,7 @@
             <a:fld id="{B61BEF0D-F0BB-DE4B-95CE-6DB70DBA9567}" type="datetimeFigureOut">
               <a:rPr lang="en-US" smtClean="0"/>
               <a:pPr/>
-              <a:t>5/10/2024</a:t>
+              <a:t>5/20/2024</a:t>
             </a:fld>
             <a:endParaRPr lang="en-US" dirty="0"/>
           </a:p>
@@ -2102,7 +2335,7 @@
             <a:fld id="{B61BEF0D-F0BB-DE4B-95CE-6DB70DBA9567}" type="datetimeFigureOut">
               <a:rPr lang="en-US" smtClean="0"/>
               <a:pPr/>
-              <a:t>5/10/2024</a:t>
+              <a:t>5/20/2024</a:t>
             </a:fld>
             <a:endParaRPr lang="en-US" dirty="0"/>
           </a:p>
@@ -2418,7 +2651,7 @@
             <a:fld id="{B61BEF0D-F0BB-DE4B-95CE-6DB70DBA9567}" type="datetimeFigureOut">
               <a:rPr lang="en-US" smtClean="0"/>
               <a:pPr/>
-              <a:t>5/10/2024</a:t>
+              <a:t>5/20/2024</a:t>
             </a:fld>
             <a:endParaRPr lang="en-US" dirty="0"/>
           </a:p>
@@ -2753,7 +2986,7 @@
             <a:fld id="{B61BEF0D-F0BB-DE4B-95CE-6DB70DBA9567}" type="datetimeFigureOut">
               <a:rPr lang="en-US" smtClean="0"/>
               <a:pPr/>
-              <a:t>5/10/2024</a:t>
+              <a:t>5/20/2024</a:t>
             </a:fld>
             <a:endParaRPr lang="en-US" dirty="0"/>
           </a:p>
@@ -3069,7 +3302,7 @@
             <a:fld id="{B61BEF0D-F0BB-DE4B-95CE-6DB70DBA9567}" type="datetimeFigureOut">
               <a:rPr lang="en-US" smtClean="0"/>
               <a:pPr/>
-              <a:t>5/10/2024</a:t>
+              <a:t>5/20/2024</a:t>
             </a:fld>
             <a:endParaRPr lang="en-US" dirty="0"/>
           </a:p>
@@ -3464,7 +3697,7 @@
             <a:fld id="{B61BEF0D-F0BB-DE4B-95CE-6DB70DBA9567}" type="datetimeFigureOut">
               <a:rPr lang="en-US" smtClean="0"/>
               <a:pPr/>
-              <a:t>5/10/2024</a:t>
+              <a:t>5/20/2024</a:t>
             </a:fld>
             <a:endParaRPr lang="en-US" dirty="0"/>
           </a:p>
@@ -3635,7 +3868,7 @@
           <a:p>
             <a:fld id="{55C6B4A9-1611-4792-9094-5F34BCA07E0B}" type="datetimeFigureOut">
               <a:rPr lang="en-US" smtClean="0"/>
-              <a:t>5/10/2024</a:t>
+              <a:t>5/20/2024</a:t>
             </a:fld>
             <a:endParaRPr lang="en-US" dirty="0"/>
           </a:p>
@@ -3816,7 +4049,7 @@
             <a:fld id="{B61BEF0D-F0BB-DE4B-95CE-6DB70DBA9567}" type="datetimeFigureOut">
               <a:rPr lang="en-US" smtClean="0"/>
               <a:pPr/>
-              <a:t>5/10/2024</a:t>
+              <a:t>5/20/2024</a:t>
             </a:fld>
             <a:endParaRPr lang="en-US" dirty="0"/>
           </a:p>
@@ -3988,7 +4221,7 @@
             <a:fld id="{B61BEF0D-F0BB-DE4B-95CE-6DB70DBA9567}" type="datetimeFigureOut">
               <a:rPr lang="en-US" smtClean="0"/>
               <a:pPr/>
-              <a:t>5/10/2024</a:t>
+              <a:t>5/20/2024</a:t>
             </a:fld>
             <a:endParaRPr lang="en-US" dirty="0"/>
           </a:p>
@@ -4237,7 +4470,7 @@
             <a:fld id="{B61BEF0D-F0BB-DE4B-95CE-6DB70DBA9567}" type="datetimeFigureOut">
               <a:rPr lang="en-US" smtClean="0"/>
               <a:pPr/>
-              <a:t>5/10/2024</a:t>
+              <a:t>5/20/2024</a:t>
             </a:fld>
             <a:endParaRPr lang="en-US" dirty="0"/>
           </a:p>
@@ -4470,7 +4703,7 @@
           <a:p>
             <a:fld id="{EB712588-04B1-427B-82EE-E8DB90309F08}" type="datetimeFigureOut">
               <a:rPr lang="en-US" smtClean="0"/>
-              <a:t>5/10/2024</a:t>
+              <a:t>5/20/2024</a:t>
             </a:fld>
             <a:endParaRPr lang="en-US" dirty="0"/>
           </a:p>
@@ -4845,7 +5078,7 @@
             <a:fld id="{B61BEF0D-F0BB-DE4B-95CE-6DB70DBA9567}" type="datetimeFigureOut">
               <a:rPr lang="en-US" smtClean="0"/>
               <a:pPr/>
-              <a:t>5/10/2024</a:t>
+              <a:t>5/20/2024</a:t>
             </a:fld>
             <a:endParaRPr lang="en-US" dirty="0"/>
           </a:p>
@@ -4970,7 +5203,7 @@
             <a:fld id="{B61BEF0D-F0BB-DE4B-95CE-6DB70DBA9567}" type="datetimeFigureOut">
               <a:rPr lang="en-US" smtClean="0"/>
               <a:pPr/>
-              <a:t>5/10/2024</a:t>
+              <a:t>5/20/2024</a:t>
             </a:fld>
             <a:endParaRPr lang="en-US" dirty="0"/>
           </a:p>
@@ -5067,7 +5300,7 @@
             <a:fld id="{B61BEF0D-F0BB-DE4B-95CE-6DB70DBA9567}" type="datetimeFigureOut">
               <a:rPr lang="en-US" smtClean="0"/>
               <a:pPr/>
-              <a:t>5/10/2024</a:t>
+              <a:t>5/20/2024</a:t>
             </a:fld>
             <a:endParaRPr lang="en-US" dirty="0"/>
           </a:p>
@@ -5323,7 +5556,7 @@
           <a:p>
             <a:fld id="{42A54C80-263E-416B-A8E0-580EDEADCBDC}" type="datetimeFigureOut">
               <a:rPr lang="en-US" smtClean="0"/>
-              <a:t>5/10/2024</a:t>
+              <a:t>5/20/2024</a:t>
             </a:fld>
             <a:endParaRPr lang="en-US" dirty="0"/>
           </a:p>
@@ -5630,7 +5863,7 @@
             <a:fld id="{B61BEF0D-F0BB-DE4B-95CE-6DB70DBA9567}" type="datetimeFigureOut">
               <a:rPr lang="en-US" smtClean="0"/>
               <a:pPr/>
-              <a:t>5/10/2024</a:t>
+              <a:t>5/20/2024</a:t>
             </a:fld>
             <a:endParaRPr lang="en-US" dirty="0"/>
           </a:p>
@@ -6333,7 +6566,7 @@
             <a:fld id="{B61BEF0D-F0BB-DE4B-95CE-6DB70DBA9567}" type="datetimeFigureOut">
               <a:rPr lang="en-US" smtClean="0"/>
               <a:pPr/>
-              <a:t>5/10/2024</a:t>
+              <a:t>5/20/2024</a:t>
             </a:fld>
             <a:endParaRPr lang="en-US" dirty="0"/>
           </a:p>
@@ -7357,6 +7590,124 @@
 </file>
 
 <file path=ppt/slides/slide10.xml><?xml version="1.0" encoding="utf-8"?>
+<p:sld xmlns:a="http://schemas.openxmlformats.org/drawingml/2006/main" xmlns:r="http://schemas.openxmlformats.org/officeDocument/2006/relationships" xmlns:p="http://schemas.openxmlformats.org/presentationml/2006/main">
+  <p:cSld>
+    <p:spTree>
+      <p:nvGrpSpPr>
+        <p:cNvPr id="1" name=""/>
+        <p:cNvGrpSpPr/>
+        <p:nvPr/>
+      </p:nvGrpSpPr>
+      <p:grpSpPr>
+        <a:xfrm>
+          <a:off x="0" y="0"/>
+          <a:ext cx="0" cy="0"/>
+          <a:chOff x="0" y="0"/>
+          <a:chExt cx="0" cy="0"/>
+        </a:xfrm>
+      </p:grpSpPr>
+      <p:pic>
+        <p:nvPicPr>
+          <p:cNvPr id="3" name="Obraz 2">
+            <a:extLst>
+              <a:ext uri="{FF2B5EF4-FFF2-40B4-BE49-F238E27FC236}">
+                <a16:creationId xmlns:a16="http://schemas.microsoft.com/office/drawing/2014/main" id="{1BE05510-806E-F283-CD8D-226B42867901}"/>
+              </a:ext>
+            </a:extLst>
+          </p:cNvPr>
+          <p:cNvPicPr>
+            <a:picLocks noChangeAspect="1"/>
+          </p:cNvPicPr>
+          <p:nvPr/>
+        </p:nvPicPr>
+        <p:blipFill rotWithShape="1">
+          <a:blip r:embed="rId3"/>
+          <a:srcRect l="9907" t="14816" r="15185" b="10781"/>
+          <a:stretch/>
+        </p:blipFill>
+        <p:spPr>
+          <a:xfrm>
+            <a:off x="0" y="-79021"/>
+            <a:ext cx="12192000" cy="6937022"/>
+          </a:xfrm>
+          <a:prstGeom prst="rect">
+            <a:avLst/>
+          </a:prstGeom>
+        </p:spPr>
+      </p:pic>
+    </p:spTree>
+    <p:extLst>
+      <p:ext uri="{BB962C8B-B14F-4D97-AF65-F5344CB8AC3E}">
+        <p14:creationId xmlns:p14="http://schemas.microsoft.com/office/powerpoint/2010/main" val="185749905"/>
+      </p:ext>
+    </p:extLst>
+  </p:cSld>
+  <p:clrMapOvr>
+    <a:masterClrMapping/>
+  </p:clrMapOvr>
+</p:sld>
+</file>
+
+<file path=ppt/slides/slide11.xml><?xml version="1.0" encoding="utf-8"?>
+<p:sld xmlns:a="http://schemas.openxmlformats.org/drawingml/2006/main" xmlns:r="http://schemas.openxmlformats.org/officeDocument/2006/relationships" xmlns:p="http://schemas.openxmlformats.org/presentationml/2006/main">
+  <p:cSld>
+    <p:spTree>
+      <p:nvGrpSpPr>
+        <p:cNvPr id="1" name=""/>
+        <p:cNvGrpSpPr/>
+        <p:nvPr/>
+      </p:nvGrpSpPr>
+      <p:grpSpPr>
+        <a:xfrm>
+          <a:off x="0" y="0"/>
+          <a:ext cx="0" cy="0"/>
+          <a:chOff x="0" y="0"/>
+          <a:chExt cx="0" cy="0"/>
+        </a:xfrm>
+      </p:grpSpPr>
+      <p:pic>
+        <p:nvPicPr>
+          <p:cNvPr id="3" name="Obraz 2">
+            <a:extLst>
+              <a:ext uri="{FF2B5EF4-FFF2-40B4-BE49-F238E27FC236}">
+                <a16:creationId xmlns:a16="http://schemas.microsoft.com/office/drawing/2014/main" id="{53CBABC3-110E-5B21-D895-98959B87D0B3}"/>
+              </a:ext>
+            </a:extLst>
+          </p:cNvPr>
+          <p:cNvPicPr>
+            <a:picLocks noChangeAspect="1"/>
+          </p:cNvPicPr>
+          <p:nvPr/>
+        </p:nvPicPr>
+        <p:blipFill rotWithShape="1">
+          <a:blip r:embed="rId3"/>
+          <a:srcRect l="10093" t="14650" r="14908" b="10289"/>
+          <a:stretch/>
+        </p:blipFill>
+        <p:spPr>
+          <a:xfrm>
+            <a:off x="0" y="-11290"/>
+            <a:ext cx="12192000" cy="6869290"/>
+          </a:xfrm>
+          <a:prstGeom prst="rect">
+            <a:avLst/>
+          </a:prstGeom>
+        </p:spPr>
+      </p:pic>
+    </p:spTree>
+    <p:extLst>
+      <p:ext uri="{BB962C8B-B14F-4D97-AF65-F5344CB8AC3E}">
+        <p14:creationId xmlns:p14="http://schemas.microsoft.com/office/powerpoint/2010/main" val="2219284192"/>
+      </p:ext>
+    </p:extLst>
+  </p:cSld>
+  <p:clrMapOvr>
+    <a:masterClrMapping/>
+  </p:clrMapOvr>
+</p:sld>
+</file>
+
+<file path=ppt/slides/slide12.xml><?xml version="1.0" encoding="utf-8"?>
 <p:sld xmlns:a="http://schemas.openxmlformats.org/drawingml/2006/main" xmlns:r="http://schemas.openxmlformats.org/officeDocument/2006/relationships" xmlns:p="http://schemas.openxmlformats.org/presentationml/2006/main" showMasterSp="0">
   <p:cSld>
     <p:spTree>
@@ -7741,12 +8092,6 @@
           <a:p>
             <a:r>
               <a:rPr lang="pl-PL" dirty="0"/>
-              <a:t>Rozwój telefonii komórkowej, Internetu wpływa na wzrost PKB</a:t>
-            </a:r>
-          </a:p>
-          <a:p>
-            <a:r>
-              <a:rPr lang="pl-PL" dirty="0"/>
               <a:t>Transport wpływa na wzrost PKB i wyższą emisję CO</a:t>
             </a:r>
             <a:r>
@@ -7757,7 +8102,7 @@
           <a:p>
             <a:r>
               <a:rPr lang="pl-PL" dirty="0"/>
-              <a:t>Państwa o największym wzroście gospodarczym i jednocześnie najwięksi emitenci CO</a:t>
+              <a:t>Globalny udział CO</a:t>
             </a:r>
             <a:r>
               <a:rPr lang="pl-PL" baseline="-25000" dirty="0"/>
@@ -7765,6 +8110,20 @@
             </a:r>
             <a:r>
               <a:rPr lang="pl-PL" dirty="0"/>
+              <a:t> z transportu w 2019 r. wyniósł ok. 20%</a:t>
+            </a:r>
+          </a:p>
+          <a:p>
+            <a:r>
+              <a:rPr lang="pl-PL" dirty="0"/>
+              <a:t>Państwa o największym wzroście gospodarczym i jednocześnie najwięksi emitenci CO</a:t>
+            </a:r>
+            <a:r>
+              <a:rPr lang="pl-PL" baseline="-25000" dirty="0"/>
+              <a:t>2</a:t>
+            </a:r>
+            <a:r>
+              <a:rPr lang="pl-PL" dirty="0"/>
               <a:t>: USA, Chiny, Indie</a:t>
             </a:r>
           </a:p>
@@ -7785,6 +8144,21 @@
             </a:r>
           </a:p>
           <a:p>
+            <a:r>
+              <a:rPr lang="pl-PL" dirty="0"/>
+              <a:t>Rozwój telefonii komórkowej, Internetu wpływa na wzrost PKB</a:t>
+            </a:r>
+          </a:p>
+          <a:p>
+            <a:r>
+              <a:rPr lang="pl-PL" dirty="0"/>
+              <a:t>Po 2000 roku widoczna jest korelacja między rozwojem technologii komunikacyjnych a ich wpływem na PKB</a:t>
+            </a:r>
+          </a:p>
+          <a:p>
+            <a:pPr marL="0" indent="0">
+              <a:buNone/>
+            </a:pPr>
             <a:endParaRPr lang="pl-PL" dirty="0"/>
           </a:p>
         </p:txBody>
@@ -7884,7 +8258,7 @@
         </p:nvSpPr>
         <p:spPr>
           <a:xfrm>
-            <a:off x="677335" y="685805"/>
+            <a:off x="620889" y="616380"/>
             <a:ext cx="8596668" cy="717395"/>
           </a:xfrm>
         </p:spPr>
@@ -7925,8 +8299,8 @@
         </p:nvSpPr>
         <p:spPr>
           <a:xfrm>
-            <a:off x="677334" y="1562884"/>
-            <a:ext cx="10972799" cy="1276889"/>
+            <a:off x="620889" y="1346816"/>
+            <a:ext cx="10972799" cy="1025143"/>
           </a:xfrm>
         </p:spPr>
         <p:txBody>
@@ -7957,7 +8331,7 @@
         </p:nvSpPr>
         <p:spPr>
           <a:xfrm>
-            <a:off x="677334" y="3557168"/>
+            <a:off x="609599" y="5643041"/>
             <a:ext cx="8410910" cy="369332"/>
           </a:xfrm>
           <a:prstGeom prst="rect">
@@ -8019,7 +8393,7 @@
         </p:nvSpPr>
         <p:spPr>
           <a:xfrm>
-            <a:off x="677334" y="2839773"/>
+            <a:off x="609600" y="4925646"/>
             <a:ext cx="8596668" cy="717395"/>
           </a:xfrm>
           <a:prstGeom prst="rect">
@@ -8112,6 +8486,509 @@
                 <a:cs typeface="Arial" panose="020B0604020202020204" pitchFamily="34" charset="0"/>
               </a:rPr>
               <a:t>GitHub</a:t>
+            </a:r>
+            <a:endParaRPr lang="pl-PL" b="1" dirty="0">
+              <a:solidFill>
+                <a:srgbClr val="006EFB"/>
+              </a:solidFill>
+              <a:latin typeface="Arial" panose="020B0604020202020204" pitchFamily="34" charset="0"/>
+              <a:cs typeface="Arial" panose="020B0604020202020204" pitchFamily="34" charset="0"/>
+            </a:endParaRPr>
+          </a:p>
+        </p:txBody>
+      </p:sp>
+      <p:sp>
+        <p:nvSpPr>
+          <p:cNvPr id="4" name="Symbol zastępczy zawartości 2">
+            <a:extLst>
+              <a:ext uri="{FF2B5EF4-FFF2-40B4-BE49-F238E27FC236}">
+                <a16:creationId xmlns:a16="http://schemas.microsoft.com/office/drawing/2014/main" id="{B548470D-EFF6-2951-41A3-65962E89CD02}"/>
+              </a:ext>
+            </a:extLst>
+          </p:cNvPr>
+          <p:cNvSpPr txBox="1">
+            <a:spLocks/>
+          </p:cNvSpPr>
+          <p:nvPr/>
+        </p:nvSpPr>
+        <p:spPr>
+          <a:xfrm>
+            <a:off x="609598" y="3361075"/>
+            <a:ext cx="10972799" cy="1230283"/>
+          </a:xfrm>
+          <a:prstGeom prst="rect">
+            <a:avLst/>
+          </a:prstGeom>
+        </p:spPr>
+        <p:txBody>
+          <a:bodyPr vert="horz" lIns="91440" tIns="45720" rIns="91440" bIns="45720" rtlCol="0">
+            <a:normAutofit/>
+          </a:bodyPr>
+          <a:lstStyle>
+            <a:lvl1pPr marL="342900" indent="-342900" algn="l" defTabSz="457200" rtl="0" eaLnBrk="1" latinLnBrk="0" hangingPunct="1">
+              <a:spcBef>
+                <a:spcPts val="1000"/>
+              </a:spcBef>
+              <a:spcAft>
+                <a:spcPts val="0"/>
+              </a:spcAft>
+              <a:buClr>
+                <a:schemeClr val="accent1"/>
+              </a:buClr>
+              <a:buSzPct val="80000"/>
+              <a:buFont typeface="Wingdings 3" charset="2"/>
+              <a:buChar char=""/>
+              <a:defRPr sz="1800" kern="1200">
+                <a:solidFill>
+                  <a:schemeClr val="tx1">
+                    <a:lumMod val="75000"/>
+                    <a:lumOff val="25000"/>
+                  </a:schemeClr>
+                </a:solidFill>
+                <a:latin typeface="+mn-lt"/>
+                <a:ea typeface="+mn-ea"/>
+                <a:cs typeface="+mn-cs"/>
+              </a:defRPr>
+            </a:lvl1pPr>
+            <a:lvl2pPr marL="742950" indent="-285750" algn="l" defTabSz="457200" rtl="0" eaLnBrk="1" latinLnBrk="0" hangingPunct="1">
+              <a:spcBef>
+                <a:spcPts val="1000"/>
+              </a:spcBef>
+              <a:spcAft>
+                <a:spcPts val="0"/>
+              </a:spcAft>
+              <a:buClr>
+                <a:schemeClr val="accent1"/>
+              </a:buClr>
+              <a:buSzPct val="80000"/>
+              <a:buFont typeface="Wingdings 3" charset="2"/>
+              <a:buChar char=""/>
+              <a:defRPr sz="1600" kern="1200">
+                <a:solidFill>
+                  <a:schemeClr val="tx1">
+                    <a:lumMod val="75000"/>
+                    <a:lumOff val="25000"/>
+                  </a:schemeClr>
+                </a:solidFill>
+                <a:latin typeface="+mn-lt"/>
+                <a:ea typeface="+mn-ea"/>
+                <a:cs typeface="+mn-cs"/>
+              </a:defRPr>
+            </a:lvl2pPr>
+            <a:lvl3pPr marL="1143000" indent="-228600" algn="l" defTabSz="457200" rtl="0" eaLnBrk="1" latinLnBrk="0" hangingPunct="1">
+              <a:spcBef>
+                <a:spcPts val="1000"/>
+              </a:spcBef>
+              <a:spcAft>
+                <a:spcPts val="0"/>
+              </a:spcAft>
+              <a:buClr>
+                <a:schemeClr val="accent1"/>
+              </a:buClr>
+              <a:buSzPct val="80000"/>
+              <a:buFont typeface="Wingdings 3" charset="2"/>
+              <a:buChar char=""/>
+              <a:defRPr sz="1400" kern="1200">
+                <a:solidFill>
+                  <a:schemeClr val="tx1">
+                    <a:lumMod val="75000"/>
+                    <a:lumOff val="25000"/>
+                  </a:schemeClr>
+                </a:solidFill>
+                <a:latin typeface="+mn-lt"/>
+                <a:ea typeface="+mn-ea"/>
+                <a:cs typeface="+mn-cs"/>
+              </a:defRPr>
+            </a:lvl3pPr>
+            <a:lvl4pPr marL="1600200" indent="-228600" algn="l" defTabSz="457200" rtl="0" eaLnBrk="1" latinLnBrk="0" hangingPunct="1">
+              <a:spcBef>
+                <a:spcPts val="1000"/>
+              </a:spcBef>
+              <a:spcAft>
+                <a:spcPts val="0"/>
+              </a:spcAft>
+              <a:buClr>
+                <a:schemeClr val="accent1"/>
+              </a:buClr>
+              <a:buSzPct val="80000"/>
+              <a:buFont typeface="Wingdings 3" charset="2"/>
+              <a:buChar char=""/>
+              <a:defRPr sz="1200" kern="1200">
+                <a:solidFill>
+                  <a:schemeClr val="tx1">
+                    <a:lumMod val="75000"/>
+                    <a:lumOff val="25000"/>
+                  </a:schemeClr>
+                </a:solidFill>
+                <a:latin typeface="+mn-lt"/>
+                <a:ea typeface="+mn-ea"/>
+                <a:cs typeface="+mn-cs"/>
+              </a:defRPr>
+            </a:lvl4pPr>
+            <a:lvl5pPr marL="2057400" indent="-228600" algn="l" defTabSz="457200" rtl="0" eaLnBrk="1" latinLnBrk="0" hangingPunct="1">
+              <a:spcBef>
+                <a:spcPts val="1000"/>
+              </a:spcBef>
+              <a:spcAft>
+                <a:spcPts val="0"/>
+              </a:spcAft>
+              <a:buClr>
+                <a:schemeClr val="accent1"/>
+              </a:buClr>
+              <a:buSzPct val="80000"/>
+              <a:buFont typeface="Wingdings 3" charset="2"/>
+              <a:buChar char=""/>
+              <a:defRPr sz="1200" kern="1200">
+                <a:solidFill>
+                  <a:schemeClr val="tx1">
+                    <a:lumMod val="75000"/>
+                    <a:lumOff val="25000"/>
+                  </a:schemeClr>
+                </a:solidFill>
+                <a:latin typeface="+mn-lt"/>
+                <a:ea typeface="+mn-ea"/>
+                <a:cs typeface="+mn-cs"/>
+              </a:defRPr>
+            </a:lvl5pPr>
+            <a:lvl6pPr marL="2514600" indent="-228600" algn="l" defTabSz="457200" rtl="0" eaLnBrk="1" latinLnBrk="0" hangingPunct="1">
+              <a:spcBef>
+                <a:spcPts val="1000"/>
+              </a:spcBef>
+              <a:spcAft>
+                <a:spcPts val="0"/>
+              </a:spcAft>
+              <a:buClr>
+                <a:schemeClr val="accent1"/>
+              </a:buClr>
+              <a:buSzPct val="80000"/>
+              <a:buFont typeface="Wingdings 3" charset="2"/>
+              <a:buChar char=""/>
+              <a:defRPr sz="1200" kern="1200">
+                <a:solidFill>
+                  <a:schemeClr val="tx1">
+                    <a:lumMod val="75000"/>
+                    <a:lumOff val="25000"/>
+                  </a:schemeClr>
+                </a:solidFill>
+                <a:latin typeface="+mn-lt"/>
+                <a:ea typeface="+mn-ea"/>
+                <a:cs typeface="+mn-cs"/>
+              </a:defRPr>
+            </a:lvl6pPr>
+            <a:lvl7pPr marL="2971800" indent="-228600" algn="l" defTabSz="457200" rtl="0" eaLnBrk="1" latinLnBrk="0" hangingPunct="1">
+              <a:spcBef>
+                <a:spcPts val="1000"/>
+              </a:spcBef>
+              <a:spcAft>
+                <a:spcPts val="0"/>
+              </a:spcAft>
+              <a:buClr>
+                <a:schemeClr val="accent1"/>
+              </a:buClr>
+              <a:buSzPct val="80000"/>
+              <a:buFont typeface="Wingdings 3" charset="2"/>
+              <a:buChar char=""/>
+              <a:defRPr sz="1200" kern="1200">
+                <a:solidFill>
+                  <a:schemeClr val="tx1">
+                    <a:lumMod val="75000"/>
+                    <a:lumOff val="25000"/>
+                  </a:schemeClr>
+                </a:solidFill>
+                <a:latin typeface="+mn-lt"/>
+                <a:ea typeface="+mn-ea"/>
+                <a:cs typeface="+mn-cs"/>
+              </a:defRPr>
+            </a:lvl7pPr>
+            <a:lvl8pPr marL="3429000" indent="-228600" algn="l" defTabSz="457200" rtl="0" eaLnBrk="1" latinLnBrk="0" hangingPunct="1">
+              <a:spcBef>
+                <a:spcPts val="1000"/>
+              </a:spcBef>
+              <a:spcAft>
+                <a:spcPts val="0"/>
+              </a:spcAft>
+              <a:buClr>
+                <a:schemeClr val="accent1"/>
+              </a:buClr>
+              <a:buSzPct val="80000"/>
+              <a:buFont typeface="Wingdings 3" charset="2"/>
+              <a:buChar char=""/>
+              <a:defRPr sz="1200" kern="1200">
+                <a:solidFill>
+                  <a:schemeClr val="tx1">
+                    <a:lumMod val="75000"/>
+                    <a:lumOff val="25000"/>
+                  </a:schemeClr>
+                </a:solidFill>
+                <a:latin typeface="+mn-lt"/>
+                <a:ea typeface="+mn-ea"/>
+                <a:cs typeface="+mn-cs"/>
+              </a:defRPr>
+            </a:lvl8pPr>
+            <a:lvl9pPr marL="3886200" indent="-228600" algn="l" defTabSz="457200" rtl="0" eaLnBrk="1" latinLnBrk="0" hangingPunct="1">
+              <a:spcBef>
+                <a:spcPts val="1000"/>
+              </a:spcBef>
+              <a:spcAft>
+                <a:spcPts val="0"/>
+              </a:spcAft>
+              <a:buClr>
+                <a:schemeClr val="accent1"/>
+              </a:buClr>
+              <a:buSzPct val="80000"/>
+              <a:buFont typeface="Wingdings 3" charset="2"/>
+              <a:buChar char=""/>
+              <a:defRPr sz="1200" kern="1200">
+                <a:solidFill>
+                  <a:schemeClr val="tx1">
+                    <a:lumMod val="75000"/>
+                    <a:lumOff val="25000"/>
+                  </a:schemeClr>
+                </a:solidFill>
+                <a:latin typeface="+mn-lt"/>
+                <a:ea typeface="+mn-ea"/>
+                <a:cs typeface="+mn-cs"/>
+              </a:defRPr>
+            </a:lvl9pPr>
+          </a:lstStyle>
+          <a:p>
+            <a:pPr algn="l"/>
+            <a:r>
+              <a:rPr lang="pl-PL" i="0" dirty="0">
+                <a:solidFill>
+                  <a:srgbClr val="1F2328"/>
+                </a:solidFill>
+                <a:effectLst/>
+                <a:highlight>
+                  <a:srgbClr val="FFFFFF"/>
+                </a:highlight>
+              </a:rPr>
+              <a:t>Dostęp do środków transportu i ich efektywność energetyczna/emisyjność</a:t>
+            </a:r>
+          </a:p>
+          <a:p>
+            <a:pPr lvl="1"/>
+            <a:r>
+              <a:rPr lang="pl-PL" i="1" dirty="0" err="1">
+                <a:solidFill>
+                  <a:schemeClr val="accent5"/>
+                </a:solidFill>
+                <a:effectLst/>
+                <a:highlight>
+                  <a:srgbClr val="FFFFFF"/>
+                </a:highlight>
+              </a:rPr>
+              <a:t>Annual</a:t>
+            </a:r>
+            <a:r>
+              <a:rPr lang="pl-PL" i="1" dirty="0">
+                <a:solidFill>
+                  <a:schemeClr val="accent5"/>
+                </a:solidFill>
+                <a:effectLst/>
+                <a:highlight>
+                  <a:srgbClr val="FFFFFF"/>
+                </a:highlight>
+              </a:rPr>
+              <a:t> CO</a:t>
+            </a:r>
+            <a:r>
+              <a:rPr lang="pl-PL" i="1" baseline="-25000" dirty="0">
+                <a:solidFill>
+                  <a:schemeClr val="accent5"/>
+                </a:solidFill>
+                <a:effectLst/>
+                <a:highlight>
+                  <a:srgbClr val="FFFFFF"/>
+                </a:highlight>
+              </a:rPr>
+              <a:t>2</a:t>
+            </a:r>
+            <a:r>
+              <a:rPr lang="pl-PL" i="1" dirty="0">
+                <a:solidFill>
+                  <a:schemeClr val="accent5"/>
+                </a:solidFill>
+                <a:effectLst/>
+                <a:highlight>
+                  <a:srgbClr val="FFFFFF"/>
+                </a:highlight>
+              </a:rPr>
+              <a:t> </a:t>
+            </a:r>
+            <a:r>
+              <a:rPr lang="pl-PL" i="1" dirty="0" err="1">
+                <a:solidFill>
+                  <a:schemeClr val="accent5"/>
+                </a:solidFill>
+                <a:effectLst/>
+                <a:highlight>
+                  <a:srgbClr val="FFFFFF"/>
+                </a:highlight>
+              </a:rPr>
+              <a:t>emission</a:t>
+            </a:r>
+            <a:r>
+              <a:rPr lang="pl-PL" i="1" dirty="0" err="1">
+                <a:solidFill>
+                  <a:schemeClr val="accent5"/>
+                </a:solidFill>
+                <a:highlight>
+                  <a:srgbClr val="FFFFFF"/>
+                </a:highlight>
+              </a:rPr>
+              <a:t>s</a:t>
+            </a:r>
+            <a:r>
+              <a:rPr lang="pl-PL" i="1" dirty="0">
+                <a:solidFill>
+                  <a:schemeClr val="accent5"/>
+                </a:solidFill>
+                <a:highlight>
+                  <a:srgbClr val="FFFFFF"/>
+                </a:highlight>
+              </a:rPr>
+              <a:t> </a:t>
+            </a:r>
+            <a:r>
+              <a:rPr lang="pl-PL" i="1" dirty="0">
+                <a:solidFill>
+                  <a:schemeClr val="accent5"/>
+                </a:solidFill>
+                <a:effectLst/>
+                <a:highlight>
+                  <a:srgbClr val="FFFFFF"/>
+                </a:highlight>
+              </a:rPr>
+              <a:t>vs. GDP w czasie</a:t>
+            </a:r>
+          </a:p>
+          <a:p>
+            <a:pPr algn="l"/>
+            <a:r>
+              <a:rPr lang="pl-PL" i="0" dirty="0">
+                <a:solidFill>
+                  <a:srgbClr val="1F2328"/>
+                </a:solidFill>
+                <a:effectLst/>
+                <a:highlight>
+                  <a:srgbClr val="FFFFFF"/>
+                </a:highlight>
+              </a:rPr>
+              <a:t>Dostęp do technologii komunikacyjnych vs. GDP w czasie</a:t>
+            </a:r>
+          </a:p>
+        </p:txBody>
+      </p:sp>
+      <p:sp>
+        <p:nvSpPr>
+          <p:cNvPr id="8" name="Tytuł 1">
+            <a:extLst>
+              <a:ext uri="{FF2B5EF4-FFF2-40B4-BE49-F238E27FC236}">
+                <a16:creationId xmlns:a16="http://schemas.microsoft.com/office/drawing/2014/main" id="{A63635E8-2CD9-BF46-178A-A8618CD9C151}"/>
+              </a:ext>
+            </a:extLst>
+          </p:cNvPr>
+          <p:cNvSpPr txBox="1">
+            <a:spLocks/>
+          </p:cNvSpPr>
+          <p:nvPr/>
+        </p:nvSpPr>
+        <p:spPr>
+          <a:xfrm>
+            <a:off x="609599" y="2706247"/>
+            <a:ext cx="8596668" cy="717395"/>
+          </a:xfrm>
+          <a:prstGeom prst="rect">
+            <a:avLst/>
+          </a:prstGeom>
+        </p:spPr>
+        <p:txBody>
+          <a:bodyPr vert="horz" lIns="91440" tIns="45720" rIns="91440" bIns="45720" rtlCol="0" anchor="t">
+            <a:normAutofit/>
+          </a:bodyPr>
+          <a:lstStyle>
+            <a:lvl1pPr algn="l" defTabSz="457200" rtl="0" eaLnBrk="1" latinLnBrk="0" hangingPunct="1">
+              <a:spcBef>
+                <a:spcPct val="0"/>
+              </a:spcBef>
+              <a:buNone/>
+              <a:defRPr sz="3600" kern="1200">
+                <a:solidFill>
+                  <a:schemeClr val="accent1"/>
+                </a:solidFill>
+                <a:latin typeface="+mj-lt"/>
+                <a:ea typeface="+mj-ea"/>
+                <a:cs typeface="+mj-cs"/>
+              </a:defRPr>
+            </a:lvl1pPr>
+            <a:lvl2pPr eaLnBrk="1" hangingPunct="1">
+              <a:defRPr>
+                <a:solidFill>
+                  <a:schemeClr val="tx2"/>
+                </a:solidFill>
+              </a:defRPr>
+            </a:lvl2pPr>
+            <a:lvl3pPr eaLnBrk="1" hangingPunct="1">
+              <a:defRPr>
+                <a:solidFill>
+                  <a:schemeClr val="tx2"/>
+                </a:solidFill>
+              </a:defRPr>
+            </a:lvl3pPr>
+            <a:lvl4pPr eaLnBrk="1" hangingPunct="1">
+              <a:defRPr>
+                <a:solidFill>
+                  <a:schemeClr val="tx2"/>
+                </a:solidFill>
+              </a:defRPr>
+            </a:lvl4pPr>
+            <a:lvl5pPr eaLnBrk="1" hangingPunct="1">
+              <a:defRPr>
+                <a:solidFill>
+                  <a:schemeClr val="tx2"/>
+                </a:solidFill>
+              </a:defRPr>
+            </a:lvl5pPr>
+            <a:lvl6pPr eaLnBrk="1" hangingPunct="1">
+              <a:defRPr>
+                <a:solidFill>
+                  <a:schemeClr val="tx2"/>
+                </a:solidFill>
+              </a:defRPr>
+            </a:lvl6pPr>
+            <a:lvl7pPr eaLnBrk="1" hangingPunct="1">
+              <a:defRPr>
+                <a:solidFill>
+                  <a:schemeClr val="tx2"/>
+                </a:solidFill>
+              </a:defRPr>
+            </a:lvl7pPr>
+            <a:lvl8pPr eaLnBrk="1" hangingPunct="1">
+              <a:defRPr>
+                <a:solidFill>
+                  <a:schemeClr val="tx2"/>
+                </a:solidFill>
+              </a:defRPr>
+            </a:lvl8pPr>
+            <a:lvl9pPr eaLnBrk="1" hangingPunct="1">
+              <a:defRPr>
+                <a:solidFill>
+                  <a:schemeClr val="tx2"/>
+                </a:solidFill>
+              </a:defRPr>
+            </a:lvl9pPr>
+          </a:lstStyle>
+          <a:p>
+            <a:r>
+              <a:rPr lang="pl-PL" sz="3200" b="1" dirty="0">
+                <a:solidFill>
+                  <a:srgbClr val="006EFB"/>
+                </a:solidFill>
+                <a:latin typeface="Arial" panose="020B0604020202020204" pitchFamily="34" charset="0"/>
+                <a:cs typeface="Arial" panose="020B0604020202020204" pitchFamily="34" charset="0"/>
+              </a:rPr>
+              <a:t>Szczegółowe zadania projektu</a:t>
             </a:r>
             <a:endParaRPr lang="pl-PL" b="1" dirty="0">
               <a:solidFill>
@@ -8943,7 +9820,7 @@
           <p:nvPr/>
         </p:nvPicPr>
         <p:blipFill>
-          <a:blip r:embed="rId2">
+          <a:blip r:embed="rId3">
             <a:extLst>
               <a:ext uri="{28A0092B-C50C-407E-A947-70E740481C1C}">
                 <a14:useLocalDpi xmlns:a14="http://schemas.microsoft.com/office/drawing/2010/main" val="0"/>
@@ -8957,8 +9834,8 @@
         </p:blipFill>
         <p:spPr bwMode="auto">
           <a:xfrm>
-            <a:off x="207451" y="66237"/>
-            <a:ext cx="1843797" cy="1024332"/>
+            <a:off x="207452" y="66236"/>
+            <a:ext cx="1822934" cy="1012741"/>
           </a:xfrm>
           <a:prstGeom prst="rect">
             <a:avLst/>
@@ -8975,45 +9852,35 @@
           </a:extLst>
         </p:spPr>
       </p:pic>
-      <p:sp>
-        <p:nvSpPr>
-          <p:cNvPr id="2" name="pole tekstowe 1">
+      <p:pic>
+        <p:nvPicPr>
+          <p:cNvPr id="8" name="Obraz 7">
             <a:extLst>
               <a:ext uri="{FF2B5EF4-FFF2-40B4-BE49-F238E27FC236}">
-                <a16:creationId xmlns:a16="http://schemas.microsoft.com/office/drawing/2014/main" id="{7256DC70-B83A-769F-50EA-65AE6C730547}"/>
+                <a16:creationId xmlns:a16="http://schemas.microsoft.com/office/drawing/2014/main" id="{452A1742-4912-0A96-5302-C434D1778516}"/>
               </a:ext>
             </a:extLst>
           </p:cNvPr>
-          <p:cNvSpPr txBox="1"/>
+          <p:cNvPicPr>
+            <a:picLocks noChangeAspect="1"/>
+          </p:cNvPicPr>
           <p:nvPr/>
-        </p:nvSpPr>
+        </p:nvPicPr>
+        <p:blipFill rotWithShape="1">
+          <a:blip r:embed="rId4"/>
+          <a:srcRect l="10115" t="15733" r="15289" b="9959"/>
+          <a:stretch/>
+        </p:blipFill>
         <p:spPr>
           <a:xfrm>
-            <a:off x="790221" y="1535289"/>
-            <a:ext cx="2901245" cy="369332"/>
+            <a:off x="1004711" y="925689"/>
+            <a:ext cx="10171289" cy="5699397"/>
           </a:xfrm>
           <a:prstGeom prst="rect">
             <a:avLst/>
           </a:prstGeom>
-          <a:noFill/>
         </p:spPr>
-        <p:txBody>
-          <a:bodyPr wrap="square" rtlCol="0">
-            <a:spAutoFit/>
-          </a:bodyPr>
-          <a:lstStyle/>
-          <a:p>
-            <a:r>
-              <a:rPr lang="pl-PL" dirty="0" err="1"/>
-              <a:t>Screen</a:t>
-            </a:r>
-            <a:r>
-              <a:rPr lang="pl-PL" dirty="0"/>
-              <a:t> z projektu</a:t>
-            </a:r>
-          </a:p>
-        </p:txBody>
-      </p:sp>
+      </p:pic>
     </p:spTree>
     <p:extLst>
       <p:ext uri="{BB962C8B-B14F-4D97-AF65-F5344CB8AC3E}">
@@ -9044,45 +9911,35 @@
           <a:chExt cx="0" cy="0"/>
         </a:xfrm>
       </p:grpSpPr>
-      <p:sp>
-        <p:nvSpPr>
-          <p:cNvPr id="2" name="pole tekstowe 1">
+      <p:pic>
+        <p:nvPicPr>
+          <p:cNvPr id="4" name="Obraz 3">
             <a:extLst>
               <a:ext uri="{FF2B5EF4-FFF2-40B4-BE49-F238E27FC236}">
-                <a16:creationId xmlns:a16="http://schemas.microsoft.com/office/drawing/2014/main" id="{663173D6-AA54-5A4D-BB87-947F458D9094}"/>
+                <a16:creationId xmlns:a16="http://schemas.microsoft.com/office/drawing/2014/main" id="{CB76FD0F-0619-4CA8-F903-64DF8E98B1A3}"/>
               </a:ext>
             </a:extLst>
           </p:cNvPr>
-          <p:cNvSpPr txBox="1"/>
+          <p:cNvPicPr>
+            <a:picLocks noChangeAspect="1"/>
+          </p:cNvPicPr>
           <p:nvPr/>
-        </p:nvSpPr>
+        </p:nvPicPr>
+        <p:blipFill rotWithShape="1">
+          <a:blip r:embed="rId3"/>
+          <a:srcRect l="9906" t="15352" r="14908" b="10328"/>
+          <a:stretch/>
+        </p:blipFill>
         <p:spPr>
           <a:xfrm>
-            <a:off x="790221" y="1535289"/>
-            <a:ext cx="2901245" cy="369332"/>
+            <a:off x="0" y="0"/>
+            <a:ext cx="12192000" cy="6858001"/>
           </a:xfrm>
           <a:prstGeom prst="rect">
             <a:avLst/>
           </a:prstGeom>
-          <a:noFill/>
         </p:spPr>
-        <p:txBody>
-          <a:bodyPr wrap="square" rtlCol="0">
-            <a:spAutoFit/>
-          </a:bodyPr>
-          <a:lstStyle/>
-          <a:p>
-            <a:r>
-              <a:rPr lang="pl-PL" dirty="0" err="1"/>
-              <a:t>Screen</a:t>
-            </a:r>
-            <a:r>
-              <a:rPr lang="pl-PL" dirty="0"/>
-              <a:t> z projektu</a:t>
-            </a:r>
-          </a:p>
-        </p:txBody>
-      </p:sp>
+      </p:pic>
     </p:spTree>
     <p:extLst>
       <p:ext uri="{BB962C8B-B14F-4D97-AF65-F5344CB8AC3E}">

</xml_diff>